<commit_message>
aerosol fnn model pic
</commit_message>
<xml_diff>
--- a/23-25_Automatic-Control-Lab/Projects/24_Aerosol/Paper/Figs/pics.pptx
+++ b/23-25_Automatic-Control-Lab/Projects/24_Aerosol/Paper/Figs/pics.pptx
@@ -7,10 +7,11 @@
   <p:sldIdLst>
     <p:sldId id="266" r:id="rId2"/>
     <p:sldId id="257" r:id="rId3"/>
-    <p:sldId id="267" r:id="rId4"/>
-    <p:sldId id="270" r:id="rId5"/>
-    <p:sldId id="271" r:id="rId6"/>
-    <p:sldId id="268" r:id="rId7"/>
+    <p:sldId id="272" r:id="rId4"/>
+    <p:sldId id="267" r:id="rId5"/>
+    <p:sldId id="270" r:id="rId6"/>
+    <p:sldId id="271" r:id="rId7"/>
+    <p:sldId id="268" r:id="rId8"/>
   </p:sldIdLst>
   <p:sldSz cx="12192000" cy="6858000"/>
   <p:notesSz cx="6858000" cy="9144000"/>
@@ -264,7 +265,7 @@
           <a:p>
             <a:fld id="{D576A762-347D-4C51-B170-BDB093476561}" type="datetimeFigureOut">
               <a:rPr lang="en-US" smtClean="0"/>
-              <a:t>1/8/2025</a:t>
+              <a:t>1/9/2025</a:t>
             </a:fld>
             <a:endParaRPr lang="en-US"/>
           </a:p>
@@ -462,7 +463,7 @@
           <a:p>
             <a:fld id="{D576A762-347D-4C51-B170-BDB093476561}" type="datetimeFigureOut">
               <a:rPr lang="en-US" smtClean="0"/>
-              <a:t>1/8/2025</a:t>
+              <a:t>1/9/2025</a:t>
             </a:fld>
             <a:endParaRPr lang="en-US"/>
           </a:p>
@@ -670,7 +671,7 @@
           <a:p>
             <a:fld id="{D576A762-347D-4C51-B170-BDB093476561}" type="datetimeFigureOut">
               <a:rPr lang="en-US" smtClean="0"/>
-              <a:t>1/8/2025</a:t>
+              <a:t>1/9/2025</a:t>
             </a:fld>
             <a:endParaRPr lang="en-US"/>
           </a:p>
@@ -868,7 +869,7 @@
           <a:p>
             <a:fld id="{D576A762-347D-4C51-B170-BDB093476561}" type="datetimeFigureOut">
               <a:rPr lang="en-US" smtClean="0"/>
-              <a:t>1/8/2025</a:t>
+              <a:t>1/9/2025</a:t>
             </a:fld>
             <a:endParaRPr lang="en-US"/>
           </a:p>
@@ -1143,7 +1144,7 @@
           <a:p>
             <a:fld id="{D576A762-347D-4C51-B170-BDB093476561}" type="datetimeFigureOut">
               <a:rPr lang="en-US" smtClean="0"/>
-              <a:t>1/8/2025</a:t>
+              <a:t>1/9/2025</a:t>
             </a:fld>
             <a:endParaRPr lang="en-US"/>
           </a:p>
@@ -1408,7 +1409,7 @@
           <a:p>
             <a:fld id="{D576A762-347D-4C51-B170-BDB093476561}" type="datetimeFigureOut">
               <a:rPr lang="en-US" smtClean="0"/>
-              <a:t>1/8/2025</a:t>
+              <a:t>1/9/2025</a:t>
             </a:fld>
             <a:endParaRPr lang="en-US"/>
           </a:p>
@@ -1820,7 +1821,7 @@
           <a:p>
             <a:fld id="{D576A762-347D-4C51-B170-BDB093476561}" type="datetimeFigureOut">
               <a:rPr lang="en-US" smtClean="0"/>
-              <a:t>1/8/2025</a:t>
+              <a:t>1/9/2025</a:t>
             </a:fld>
             <a:endParaRPr lang="en-US"/>
           </a:p>
@@ -1961,7 +1962,7 @@
           <a:p>
             <a:fld id="{D576A762-347D-4C51-B170-BDB093476561}" type="datetimeFigureOut">
               <a:rPr lang="en-US" smtClean="0"/>
-              <a:t>1/8/2025</a:t>
+              <a:t>1/9/2025</a:t>
             </a:fld>
             <a:endParaRPr lang="en-US"/>
           </a:p>
@@ -2074,7 +2075,7 @@
           <a:p>
             <a:fld id="{D576A762-347D-4C51-B170-BDB093476561}" type="datetimeFigureOut">
               <a:rPr lang="en-US" smtClean="0"/>
-              <a:t>1/8/2025</a:t>
+              <a:t>1/9/2025</a:t>
             </a:fld>
             <a:endParaRPr lang="en-US"/>
           </a:p>
@@ -2385,7 +2386,7 @@
           <a:p>
             <a:fld id="{D576A762-347D-4C51-B170-BDB093476561}" type="datetimeFigureOut">
               <a:rPr lang="en-US" smtClean="0"/>
-              <a:t>1/8/2025</a:t>
+              <a:t>1/9/2025</a:t>
             </a:fld>
             <a:endParaRPr lang="en-US"/>
           </a:p>
@@ -2673,7 +2674,7 @@
           <a:p>
             <a:fld id="{D576A762-347D-4C51-B170-BDB093476561}" type="datetimeFigureOut">
               <a:rPr lang="en-US" smtClean="0"/>
-              <a:t>1/8/2025</a:t>
+              <a:t>1/9/2025</a:t>
             </a:fld>
             <a:endParaRPr lang="en-US"/>
           </a:p>
@@ -2914,7 +2915,7 @@
           <a:p>
             <a:fld id="{D576A762-347D-4C51-B170-BDB093476561}" type="datetimeFigureOut">
               <a:rPr lang="en-US" smtClean="0"/>
-              <a:t>1/8/2025</a:t>
+              <a:t>1/9/2025</a:t>
             </a:fld>
             <a:endParaRPr lang="en-US"/>
           </a:p>
@@ -4860,6 +4861,1789 @@
           <a:chExt cx="0" cy="0"/>
         </a:xfrm>
       </p:grpSpPr>
+      <p:cxnSp>
+        <p:nvCxnSpPr>
+          <p:cNvPr id="4" name="Straight Arrow Connector 3">
+            <a:extLst>
+              <a:ext uri="{FF2B5EF4-FFF2-40B4-BE49-F238E27FC236}">
+                <a16:creationId xmlns:a16="http://schemas.microsoft.com/office/drawing/2014/main" id="{578F9E99-1FB9-AD5A-B01D-2C8C7EC384C8}"/>
+              </a:ext>
+            </a:extLst>
+          </p:cNvPr>
+          <p:cNvCxnSpPr>
+            <a:cxnSpLocks/>
+          </p:cNvCxnSpPr>
+          <p:nvPr/>
+        </p:nvCxnSpPr>
+        <p:spPr>
+          <a:xfrm flipV="1">
+            <a:off x="6006707" y="4075522"/>
+            <a:ext cx="5838" cy="291595"/>
+          </a:xfrm>
+          <a:prstGeom prst="straightConnector1">
+            <a:avLst/>
+          </a:prstGeom>
+          <a:ln>
+            <a:solidFill>
+              <a:srgbClr val="00B050"/>
+            </a:solidFill>
+            <a:tailEnd type="triangle"/>
+          </a:ln>
+        </p:spPr>
+        <p:style>
+          <a:lnRef idx="2">
+            <a:schemeClr val="accent1"/>
+          </a:lnRef>
+          <a:fillRef idx="0">
+            <a:schemeClr val="accent1"/>
+          </a:fillRef>
+          <a:effectRef idx="1">
+            <a:schemeClr val="accent1"/>
+          </a:effectRef>
+          <a:fontRef idx="minor">
+            <a:schemeClr val="tx1"/>
+          </a:fontRef>
+        </p:style>
+      </p:cxnSp>
+      <p:grpSp>
+        <p:nvGrpSpPr>
+          <p:cNvPr id="51" name="Group 50">
+            <a:extLst>
+              <a:ext uri="{FF2B5EF4-FFF2-40B4-BE49-F238E27FC236}">
+                <a16:creationId xmlns:a16="http://schemas.microsoft.com/office/drawing/2014/main" id="{AE35FB04-DFB1-58D1-62B8-DD245FEA1122}"/>
+              </a:ext>
+            </a:extLst>
+          </p:cNvPr>
+          <p:cNvGrpSpPr/>
+          <p:nvPr/>
+        </p:nvGrpSpPr>
+        <p:grpSpPr>
+          <a:xfrm>
+            <a:off x="5371838" y="4281366"/>
+            <a:ext cx="2312912" cy="523220"/>
+            <a:chOff x="5371838" y="4281366"/>
+            <a:chExt cx="2312912" cy="523220"/>
+          </a:xfrm>
+        </p:grpSpPr>
+        <mc:AlternateContent xmlns:mc="http://schemas.openxmlformats.org/markup-compatibility/2006">
+          <mc:Choice xmlns:a14="http://schemas.microsoft.com/office/drawing/2010/main" Requires="a14">
+            <p:sp>
+              <p:nvSpPr>
+                <p:cNvPr id="5" name="TextBox 4">
+                  <a:extLst>
+                    <a:ext uri="{FF2B5EF4-FFF2-40B4-BE49-F238E27FC236}">
+                      <a16:creationId xmlns:a16="http://schemas.microsoft.com/office/drawing/2014/main" id="{C1365514-C46B-782D-8733-4113A0EC8637}"/>
+                    </a:ext>
+                  </a:extLst>
+                </p:cNvPr>
+                <p:cNvSpPr txBox="1"/>
+                <p:nvPr/>
+              </p:nvSpPr>
+              <p:spPr>
+                <a:xfrm>
+                  <a:off x="6799788" y="4281366"/>
+                  <a:ext cx="884962" cy="523220"/>
+                </a:xfrm>
+                <a:prstGeom prst="rect">
+                  <a:avLst/>
+                </a:prstGeom>
+                <a:noFill/>
+              </p:spPr>
+              <p:txBody>
+                <a:bodyPr wrap="square" rtlCol="0">
+                  <a:spAutoFit/>
+                </a:bodyPr>
+                <a:lstStyle/>
+                <a:p>
+                  <a:pPr/>
+                  <a14:m>
+                    <m:oMathPara xmlns:m="http://schemas.openxmlformats.org/officeDocument/2006/math">
+                      <m:oMathParaPr>
+                        <m:jc m:val="centerGroup"/>
+                      </m:oMathParaPr>
+                      <m:oMath xmlns:m="http://schemas.openxmlformats.org/officeDocument/2006/math">
+                        <m:r>
+                          <m:rPr>
+                            <m:sty m:val="p"/>
+                          </m:rPr>
+                          <a:rPr lang="en-US" sz="1400" b="0" i="0" smtClean="0">
+                            <a:latin typeface="Cambria Math" panose="02040503050406030204" pitchFamily="18" charset="0"/>
+                          </a:rPr>
+                          <m:t>Input</m:t>
+                        </m:r>
+                      </m:oMath>
+                    </m:oMathPara>
+                  </a14:m>
+                  <a:endParaRPr lang="en-US" sz="1400" b="0" dirty="0">
+                    <a:latin typeface="Cambria Math" panose="02040503050406030204" pitchFamily="18" charset="0"/>
+                  </a:endParaRPr>
+                </a:p>
+                <a:p>
+                  <a:pPr/>
+                  <a14:m>
+                    <m:oMathPara xmlns:m="http://schemas.openxmlformats.org/officeDocument/2006/math">
+                      <m:oMathParaPr>
+                        <m:jc m:val="centerGroup"/>
+                      </m:oMathParaPr>
+                      <m:oMath xmlns:m="http://schemas.openxmlformats.org/officeDocument/2006/math">
+                        <m:d>
+                          <m:dPr>
+                            <m:ctrlPr>
+                              <a:rPr lang="en-US" sz="1400" b="0" i="1" smtClean="0">
+                                <a:latin typeface="Cambria Math" panose="02040503050406030204" pitchFamily="18" charset="0"/>
+                              </a:rPr>
+                            </m:ctrlPr>
+                          </m:dPr>
+                          <m:e>
+                            <m:r>
+                              <a:rPr lang="en-US" sz="1400" b="0" i="1" smtClean="0">
+                                <a:latin typeface="Cambria Math" panose="02040503050406030204" pitchFamily="18" charset="0"/>
+                              </a:rPr>
+                              <m:t>14 </m:t>
+                            </m:r>
+                          </m:e>
+                        </m:d>
+                      </m:oMath>
+                    </m:oMathPara>
+                  </a14:m>
+                  <a:endParaRPr lang="en-US" sz="1400" dirty="0"/>
+                </a:p>
+              </p:txBody>
+            </p:sp>
+          </mc:Choice>
+          <mc:Fallback>
+            <p:sp>
+              <p:nvSpPr>
+                <p:cNvPr id="5" name="TextBox 4">
+                  <a:extLst>
+                    <a:ext uri="{FF2B5EF4-FFF2-40B4-BE49-F238E27FC236}">
+                      <a16:creationId xmlns:a16="http://schemas.microsoft.com/office/drawing/2014/main" id="{C1365514-C46B-782D-8733-4113A0EC8637}"/>
+                    </a:ext>
+                  </a:extLst>
+                </p:cNvPr>
+                <p:cNvSpPr txBox="1">
+                  <a:spLocks noRot="1" noChangeAspect="1" noMove="1" noResize="1" noEditPoints="1" noAdjustHandles="1" noChangeArrowheads="1" noChangeShapeType="1" noTextEdit="1"/>
+                </p:cNvSpPr>
+                <p:nvPr/>
+              </p:nvSpPr>
+              <p:spPr>
+                <a:xfrm>
+                  <a:off x="6799788" y="4281366"/>
+                  <a:ext cx="884962" cy="523220"/>
+                </a:xfrm>
+                <a:prstGeom prst="rect">
+                  <a:avLst/>
+                </a:prstGeom>
+                <a:blipFill>
+                  <a:blip r:embed="rId2"/>
+                  <a:stretch>
+                    <a:fillRect/>
+                  </a:stretch>
+                </a:blipFill>
+              </p:spPr>
+              <p:txBody>
+                <a:bodyPr/>
+                <a:lstStyle/>
+                <a:p>
+                  <a:r>
+                    <a:rPr lang="en-US">
+                      <a:noFill/>
+                    </a:rPr>
+                    <a:t> </a:t>
+                  </a:r>
+                </a:p>
+              </p:txBody>
+            </p:sp>
+          </mc:Fallback>
+        </mc:AlternateContent>
+        <mc:AlternateContent xmlns:mc="http://schemas.openxmlformats.org/markup-compatibility/2006">
+          <mc:Choice xmlns:a14="http://schemas.microsoft.com/office/drawing/2010/main" Requires="a14">
+            <p:sp>
+              <p:nvSpPr>
+                <p:cNvPr id="11" name="Rectangle 10">
+                  <a:extLst>
+                    <a:ext uri="{FF2B5EF4-FFF2-40B4-BE49-F238E27FC236}">
+                      <a16:creationId xmlns:a16="http://schemas.microsoft.com/office/drawing/2014/main" id="{74E03FD9-B8AF-3A51-972E-E07FB0EF0EE4}"/>
+                    </a:ext>
+                  </a:extLst>
+                </p:cNvPr>
+                <p:cNvSpPr/>
+                <p:nvPr/>
+              </p:nvSpPr>
+              <p:spPr>
+                <a:xfrm>
+                  <a:off x="5371838" y="4355225"/>
+                  <a:ext cx="1275576" cy="375503"/>
+                </a:xfrm>
+                <a:prstGeom prst="rect">
+                  <a:avLst/>
+                </a:prstGeom>
+                <a:solidFill>
+                  <a:schemeClr val="accent3">
+                    <a:lumMod val="20000"/>
+                    <a:lumOff val="80000"/>
+                  </a:schemeClr>
+                </a:solidFill>
+                <a:ln>
+                  <a:solidFill>
+                    <a:srgbClr val="00B050"/>
+                  </a:solidFill>
+                </a:ln>
+              </p:spPr>
+              <p:style>
+                <a:lnRef idx="2">
+                  <a:schemeClr val="accent1">
+                    <a:shade val="15000"/>
+                  </a:schemeClr>
+                </a:lnRef>
+                <a:fillRef idx="1">
+                  <a:schemeClr val="accent1"/>
+                </a:fillRef>
+                <a:effectRef idx="0">
+                  <a:schemeClr val="accent1"/>
+                </a:effectRef>
+                <a:fontRef idx="minor">
+                  <a:schemeClr val="lt1"/>
+                </a:fontRef>
+              </p:style>
+              <p:txBody>
+                <a:bodyPr rtlCol="0" anchor="ctr"/>
+                <a:lstStyle/>
+                <a:p>
+                  <a:pPr algn="ctr"/>
+                  <a14:m>
+                    <m:oMathPara xmlns:m="http://schemas.openxmlformats.org/officeDocument/2006/math">
+                      <m:oMathParaPr>
+                        <m:jc m:val="centerGroup"/>
+                      </m:oMathParaPr>
+                      <m:oMath xmlns:m="http://schemas.openxmlformats.org/officeDocument/2006/math">
+                        <m:sSub>
+                          <m:sSubPr>
+                            <m:ctrlPr>
+                              <a:rPr lang="en-US" sz="1200" b="1" i="1" dirty="0" smtClean="0">
+                                <a:solidFill>
+                                  <a:sysClr val="windowText" lastClr="000000"/>
+                                </a:solidFill>
+                                <a:latin typeface="Cambria Math" panose="02040503050406030204" pitchFamily="18" charset="0"/>
+                              </a:rPr>
+                            </m:ctrlPr>
+                          </m:sSubPr>
+                          <m:e>
+                            <m:r>
+                              <a:rPr lang="en-US" sz="1200" b="1" i="0" dirty="0" smtClean="0">
+                                <a:solidFill>
+                                  <a:sysClr val="windowText" lastClr="000000"/>
+                                </a:solidFill>
+                                <a:latin typeface="Cambria Math" panose="02040503050406030204" pitchFamily="18" charset="0"/>
+                              </a:rPr>
+                              <m:t>𝐗</m:t>
+                            </m:r>
+                          </m:e>
+                          <m:sub>
+                            <m:r>
+                              <a:rPr lang="en-US" sz="1200" b="1" i="0" dirty="0" smtClean="0">
+                                <a:solidFill>
+                                  <a:sysClr val="windowText" lastClr="000000"/>
+                                </a:solidFill>
+                                <a:latin typeface="Cambria Math" panose="02040503050406030204" pitchFamily="18" charset="0"/>
+                              </a:rPr>
+                              <m:t>𝟏</m:t>
+                            </m:r>
+                          </m:sub>
+                        </m:sSub>
+                        <m:r>
+                          <a:rPr lang="en-US" sz="1200" b="1" i="0" dirty="0" smtClean="0">
+                            <a:solidFill>
+                              <a:sysClr val="windowText" lastClr="000000"/>
+                            </a:solidFill>
+                            <a:latin typeface="Cambria Math" panose="02040503050406030204" pitchFamily="18" charset="0"/>
+                          </a:rPr>
+                          <m:t>,…,</m:t>
+                        </m:r>
+                        <m:sSub>
+                          <m:sSubPr>
+                            <m:ctrlPr>
+                              <a:rPr lang="en-US" sz="1200" b="1" i="1" dirty="0">
+                                <a:solidFill>
+                                  <a:sysClr val="windowText" lastClr="000000"/>
+                                </a:solidFill>
+                                <a:latin typeface="Cambria Math" panose="02040503050406030204" pitchFamily="18" charset="0"/>
+                              </a:rPr>
+                            </m:ctrlPr>
+                          </m:sSubPr>
+                          <m:e>
+                            <m:r>
+                              <a:rPr lang="en-US" sz="1200" b="1" i="1" dirty="0">
+                                <a:solidFill>
+                                  <a:sysClr val="windowText" lastClr="000000"/>
+                                </a:solidFill>
+                                <a:latin typeface="Cambria Math" panose="02040503050406030204" pitchFamily="18" charset="0"/>
+                              </a:rPr>
+                              <m:t>𝑿</m:t>
+                            </m:r>
+                          </m:e>
+                          <m:sub>
+                            <m:r>
+                              <a:rPr lang="en-US" sz="1200" b="1" i="1" dirty="0">
+                                <a:solidFill>
+                                  <a:sysClr val="windowText" lastClr="000000"/>
+                                </a:solidFill>
+                                <a:latin typeface="Cambria Math" panose="02040503050406030204" pitchFamily="18" charset="0"/>
+                              </a:rPr>
+                              <m:t>𝟏</m:t>
+                            </m:r>
+                            <m:r>
+                              <a:rPr lang="en-US" sz="1200" b="1" i="1" dirty="0" smtClean="0">
+                                <a:solidFill>
+                                  <a:sysClr val="windowText" lastClr="000000"/>
+                                </a:solidFill>
+                                <a:latin typeface="Cambria Math" panose="02040503050406030204" pitchFamily="18" charset="0"/>
+                              </a:rPr>
+                              <m:t>𝟒</m:t>
+                            </m:r>
+                          </m:sub>
+                        </m:sSub>
+                      </m:oMath>
+                    </m:oMathPara>
+                  </a14:m>
+                  <a:endParaRPr lang="en-US" sz="1200" b="1" dirty="0">
+                    <a:solidFill>
+                      <a:sysClr val="windowText" lastClr="000000"/>
+                    </a:solidFill>
+                  </a:endParaRPr>
+                </a:p>
+              </p:txBody>
+            </p:sp>
+          </mc:Choice>
+          <mc:Fallback>
+            <p:sp>
+              <p:nvSpPr>
+                <p:cNvPr id="11" name="Rectangle 10">
+                  <a:extLst>
+                    <a:ext uri="{FF2B5EF4-FFF2-40B4-BE49-F238E27FC236}">
+                      <a16:creationId xmlns:a16="http://schemas.microsoft.com/office/drawing/2014/main" id="{74E03FD9-B8AF-3A51-972E-E07FB0EF0EE4}"/>
+                    </a:ext>
+                  </a:extLst>
+                </p:cNvPr>
+                <p:cNvSpPr>
+                  <a:spLocks noRot="1" noChangeAspect="1" noMove="1" noResize="1" noEditPoints="1" noAdjustHandles="1" noChangeArrowheads="1" noChangeShapeType="1" noTextEdit="1"/>
+                </p:cNvSpPr>
+                <p:nvPr/>
+              </p:nvSpPr>
+              <p:spPr>
+                <a:xfrm>
+                  <a:off x="5371838" y="4355225"/>
+                  <a:ext cx="1275576" cy="375503"/>
+                </a:xfrm>
+                <a:prstGeom prst="rect">
+                  <a:avLst/>
+                </a:prstGeom>
+                <a:blipFill>
+                  <a:blip r:embed="rId3"/>
+                  <a:stretch>
+                    <a:fillRect/>
+                  </a:stretch>
+                </a:blipFill>
+                <a:ln>
+                  <a:solidFill>
+                    <a:srgbClr val="00B050"/>
+                  </a:solidFill>
+                </a:ln>
+              </p:spPr>
+              <p:txBody>
+                <a:bodyPr/>
+                <a:lstStyle/>
+                <a:p>
+                  <a:r>
+                    <a:rPr lang="en-US">
+                      <a:noFill/>
+                    </a:rPr>
+                    <a:t> </a:t>
+                  </a:r>
+                </a:p>
+              </p:txBody>
+            </p:sp>
+          </mc:Fallback>
+        </mc:AlternateContent>
+      </p:grpSp>
+      <p:grpSp>
+        <p:nvGrpSpPr>
+          <p:cNvPr id="55" name="Group 54">
+            <a:extLst>
+              <a:ext uri="{FF2B5EF4-FFF2-40B4-BE49-F238E27FC236}">
+                <a16:creationId xmlns:a16="http://schemas.microsoft.com/office/drawing/2014/main" id="{F0F73BC2-CB19-4FB7-5DF5-75F50590440E}"/>
+              </a:ext>
+            </a:extLst>
+          </p:cNvPr>
+          <p:cNvGrpSpPr/>
+          <p:nvPr/>
+        </p:nvGrpSpPr>
+        <p:grpSpPr>
+          <a:xfrm>
+            <a:off x="5291749" y="1863858"/>
+            <a:ext cx="2443426" cy="523220"/>
+            <a:chOff x="5291749" y="1848950"/>
+            <a:chExt cx="2443426" cy="523220"/>
+          </a:xfrm>
+        </p:grpSpPr>
+        <p:sp>
+          <p:nvSpPr>
+            <p:cNvPr id="28" name="Rectangle 27">
+              <a:extLst>
+                <a:ext uri="{FF2B5EF4-FFF2-40B4-BE49-F238E27FC236}">
+                  <a16:creationId xmlns:a16="http://schemas.microsoft.com/office/drawing/2014/main" id="{FE8C2742-43C2-30D6-85CC-21A656CF0FBC}"/>
+                </a:ext>
+              </a:extLst>
+            </p:cNvPr>
+            <p:cNvSpPr/>
+            <p:nvPr/>
+          </p:nvSpPr>
+          <p:spPr>
+            <a:xfrm>
+              <a:off x="5291749" y="1939628"/>
+              <a:ext cx="1435755" cy="341865"/>
+            </a:xfrm>
+            <a:prstGeom prst="rect">
+              <a:avLst/>
+            </a:prstGeom>
+            <a:solidFill>
+              <a:schemeClr val="accent2">
+                <a:lumMod val="20000"/>
+                <a:lumOff val="80000"/>
+              </a:schemeClr>
+            </a:solidFill>
+            <a:ln>
+              <a:solidFill>
+                <a:schemeClr val="accent2"/>
+              </a:solidFill>
+            </a:ln>
+          </p:spPr>
+          <p:style>
+            <a:lnRef idx="2">
+              <a:schemeClr val="accent1">
+                <a:shade val="15000"/>
+              </a:schemeClr>
+            </a:lnRef>
+            <a:fillRef idx="1">
+              <a:schemeClr val="accent1"/>
+            </a:fillRef>
+            <a:effectRef idx="0">
+              <a:schemeClr val="accent1"/>
+            </a:effectRef>
+            <a:fontRef idx="minor">
+              <a:schemeClr val="lt1"/>
+            </a:fontRef>
+          </p:style>
+          <p:txBody>
+            <a:bodyPr rtlCol="0" anchor="ctr"/>
+            <a:lstStyle/>
+            <a:p>
+              <a:pPr algn="ctr"/>
+              <a:r>
+                <a:rPr lang="en-US" sz="1200" b="1" dirty="0">
+                  <a:solidFill>
+                    <a:schemeClr val="tx1"/>
+                  </a:solidFill>
+                </a:rPr>
+                <a:t>Linear, ReLU</a:t>
+              </a:r>
+            </a:p>
+          </p:txBody>
+        </p:sp>
+        <mc:AlternateContent xmlns:mc="http://schemas.openxmlformats.org/markup-compatibility/2006">
+          <mc:Choice xmlns:a14="http://schemas.microsoft.com/office/drawing/2010/main" Requires="a14">
+            <p:sp>
+              <p:nvSpPr>
+                <p:cNvPr id="29" name="TextBox 28">
+                  <a:extLst>
+                    <a:ext uri="{FF2B5EF4-FFF2-40B4-BE49-F238E27FC236}">
+                      <a16:creationId xmlns:a16="http://schemas.microsoft.com/office/drawing/2014/main" id="{97C1F9EA-F8ED-0E81-2EAB-9E83358886A7}"/>
+                    </a:ext>
+                  </a:extLst>
+                </p:cNvPr>
+                <p:cNvSpPr txBox="1"/>
+                <p:nvPr/>
+              </p:nvSpPr>
+              <p:spPr>
+                <a:xfrm>
+                  <a:off x="6749364" y="1848950"/>
+                  <a:ext cx="985811" cy="523220"/>
+                </a:xfrm>
+                <a:prstGeom prst="rect">
+                  <a:avLst/>
+                </a:prstGeom>
+                <a:noFill/>
+              </p:spPr>
+              <p:txBody>
+                <a:bodyPr wrap="square" rtlCol="0">
+                  <a:spAutoFit/>
+                </a:bodyPr>
+                <a:lstStyle/>
+                <a:p>
+                  <a:pPr/>
+                  <a14:m>
+                    <m:oMathPara xmlns:m="http://schemas.openxmlformats.org/officeDocument/2006/math">
+                      <m:oMathParaPr>
+                        <m:jc m:val="centerGroup"/>
+                      </m:oMathParaPr>
+                      <m:oMath xmlns:m="http://schemas.openxmlformats.org/officeDocument/2006/math">
+                        <m:r>
+                          <m:rPr>
+                            <m:sty m:val="p"/>
+                          </m:rPr>
+                          <a:rPr lang="en-US" sz="1400" b="0" i="0" smtClean="0">
+                            <a:latin typeface="Cambria Math" panose="02040503050406030204" pitchFamily="18" charset="0"/>
+                          </a:rPr>
+                          <m:t>Linear</m:t>
+                        </m:r>
+                        <m:r>
+                          <a:rPr lang="en-US" sz="1400" b="0" i="0" smtClean="0">
+                            <a:latin typeface="Cambria Math" panose="02040503050406030204" pitchFamily="18" charset="0"/>
+                          </a:rPr>
+                          <m:t>_4</m:t>
+                        </m:r>
+                      </m:oMath>
+                    </m:oMathPara>
+                  </a14:m>
+                  <a:endParaRPr lang="en-US" sz="1400" b="0" dirty="0">
+                    <a:latin typeface="Cambria Math" panose="02040503050406030204" pitchFamily="18" charset="0"/>
+                  </a:endParaRPr>
+                </a:p>
+                <a:p>
+                  <a:pPr/>
+                  <a14:m>
+                    <m:oMathPara xmlns:m="http://schemas.openxmlformats.org/officeDocument/2006/math">
+                      <m:oMathParaPr>
+                        <m:jc m:val="centerGroup"/>
+                      </m:oMathParaPr>
+                      <m:oMath xmlns:m="http://schemas.openxmlformats.org/officeDocument/2006/math">
+                        <m:d>
+                          <m:dPr>
+                            <m:ctrlPr>
+                              <a:rPr lang="en-US" sz="1400" b="0" i="1" smtClean="0">
+                                <a:latin typeface="Cambria Math" panose="02040503050406030204" pitchFamily="18" charset="0"/>
+                              </a:rPr>
+                            </m:ctrlPr>
+                          </m:dPr>
+                          <m:e>
+                            <m:r>
+                              <a:rPr lang="en-US" sz="1400" b="0" i="1" smtClean="0">
+                                <a:latin typeface="Cambria Math" panose="02040503050406030204" pitchFamily="18" charset="0"/>
+                              </a:rPr>
+                              <m:t>256</m:t>
+                            </m:r>
+                          </m:e>
+                        </m:d>
+                      </m:oMath>
+                    </m:oMathPara>
+                  </a14:m>
+                  <a:endParaRPr lang="en-US" sz="1400" dirty="0"/>
+                </a:p>
+              </p:txBody>
+            </p:sp>
+          </mc:Choice>
+          <mc:Fallback>
+            <p:sp>
+              <p:nvSpPr>
+                <p:cNvPr id="29" name="TextBox 28">
+                  <a:extLst>
+                    <a:ext uri="{FF2B5EF4-FFF2-40B4-BE49-F238E27FC236}">
+                      <a16:creationId xmlns:a16="http://schemas.microsoft.com/office/drawing/2014/main" id="{97C1F9EA-F8ED-0E81-2EAB-9E83358886A7}"/>
+                    </a:ext>
+                  </a:extLst>
+                </p:cNvPr>
+                <p:cNvSpPr txBox="1">
+                  <a:spLocks noRot="1" noChangeAspect="1" noMove="1" noResize="1" noEditPoints="1" noAdjustHandles="1" noChangeArrowheads="1" noChangeShapeType="1" noTextEdit="1"/>
+                </p:cNvSpPr>
+                <p:nvPr/>
+              </p:nvSpPr>
+              <p:spPr>
+                <a:xfrm>
+                  <a:off x="6749364" y="1848950"/>
+                  <a:ext cx="985811" cy="523220"/>
+                </a:xfrm>
+                <a:prstGeom prst="rect">
+                  <a:avLst/>
+                </a:prstGeom>
+                <a:blipFill>
+                  <a:blip r:embed="rId4"/>
+                  <a:stretch>
+                    <a:fillRect/>
+                  </a:stretch>
+                </a:blipFill>
+              </p:spPr>
+              <p:txBody>
+                <a:bodyPr/>
+                <a:lstStyle/>
+                <a:p>
+                  <a:r>
+                    <a:rPr lang="en-US">
+                      <a:noFill/>
+                    </a:rPr>
+                    <a:t> </a:t>
+                  </a:r>
+                </a:p>
+              </p:txBody>
+            </p:sp>
+          </mc:Fallback>
+        </mc:AlternateContent>
+      </p:grpSp>
+      <p:cxnSp>
+        <p:nvCxnSpPr>
+          <p:cNvPr id="31" name="Straight Arrow Connector 30">
+            <a:extLst>
+              <a:ext uri="{FF2B5EF4-FFF2-40B4-BE49-F238E27FC236}">
+                <a16:creationId xmlns:a16="http://schemas.microsoft.com/office/drawing/2014/main" id="{28564502-1256-A9EE-914A-523104F749CC}"/>
+              </a:ext>
+            </a:extLst>
+          </p:cNvPr>
+          <p:cNvCxnSpPr>
+            <a:cxnSpLocks/>
+          </p:cNvCxnSpPr>
+          <p:nvPr/>
+        </p:nvCxnSpPr>
+        <p:spPr>
+          <a:xfrm flipV="1">
+            <a:off x="6009627" y="2301330"/>
+            <a:ext cx="0" cy="239673"/>
+          </a:xfrm>
+          <a:prstGeom prst="straightConnector1">
+            <a:avLst/>
+          </a:prstGeom>
+          <a:ln>
+            <a:tailEnd type="triangle"/>
+          </a:ln>
+        </p:spPr>
+        <p:style>
+          <a:lnRef idx="1">
+            <a:schemeClr val="accent2"/>
+          </a:lnRef>
+          <a:fillRef idx="0">
+            <a:schemeClr val="accent2"/>
+          </a:fillRef>
+          <a:effectRef idx="0">
+            <a:schemeClr val="accent2"/>
+          </a:effectRef>
+          <a:fontRef idx="minor">
+            <a:schemeClr val="tx1"/>
+          </a:fontRef>
+        </p:style>
+      </p:cxnSp>
+      <p:cxnSp>
+        <p:nvCxnSpPr>
+          <p:cNvPr id="32" name="Straight Arrow Connector 31">
+            <a:extLst>
+              <a:ext uri="{FF2B5EF4-FFF2-40B4-BE49-F238E27FC236}">
+                <a16:creationId xmlns:a16="http://schemas.microsoft.com/office/drawing/2014/main" id="{81C31028-FDBE-BE3B-5B22-1BEE02C25931}"/>
+              </a:ext>
+            </a:extLst>
+          </p:cNvPr>
+          <p:cNvCxnSpPr>
+            <a:cxnSpLocks/>
+            <a:stCxn id="28" idx="0"/>
+            <a:endCxn id="30" idx="2"/>
+          </p:cNvCxnSpPr>
+          <p:nvPr/>
+        </p:nvCxnSpPr>
+        <p:spPr>
+          <a:xfrm flipH="1" flipV="1">
+            <a:off x="6006707" y="1681452"/>
+            <a:ext cx="2920" cy="273084"/>
+          </a:xfrm>
+          <a:prstGeom prst="straightConnector1">
+            <a:avLst/>
+          </a:prstGeom>
+          <a:ln>
+            <a:tailEnd type="triangle"/>
+          </a:ln>
+        </p:spPr>
+        <p:style>
+          <a:lnRef idx="1">
+            <a:schemeClr val="accent2"/>
+          </a:lnRef>
+          <a:fillRef idx="0">
+            <a:schemeClr val="accent2"/>
+          </a:fillRef>
+          <a:effectRef idx="0">
+            <a:schemeClr val="accent2"/>
+          </a:effectRef>
+          <a:fontRef idx="minor">
+            <a:schemeClr val="tx1"/>
+          </a:fontRef>
+        </p:style>
+      </p:cxnSp>
+      <p:grpSp>
+        <p:nvGrpSpPr>
+          <p:cNvPr id="56" name="Group 55">
+            <a:extLst>
+              <a:ext uri="{FF2B5EF4-FFF2-40B4-BE49-F238E27FC236}">
+                <a16:creationId xmlns:a16="http://schemas.microsoft.com/office/drawing/2014/main" id="{F2DB839A-3156-E329-2D56-9CD17BE36652}"/>
+              </a:ext>
+            </a:extLst>
+          </p:cNvPr>
+          <p:cNvGrpSpPr/>
+          <p:nvPr/>
+        </p:nvGrpSpPr>
+        <p:grpSpPr>
+          <a:xfrm>
+            <a:off x="5288829" y="1281342"/>
+            <a:ext cx="2446346" cy="523220"/>
+            <a:chOff x="5288829" y="1281342"/>
+            <a:chExt cx="2446346" cy="523220"/>
+          </a:xfrm>
+        </p:grpSpPr>
+        <mc:AlternateContent xmlns:mc="http://schemas.openxmlformats.org/markup-compatibility/2006">
+          <mc:Choice xmlns:a14="http://schemas.microsoft.com/office/drawing/2010/main" Requires="a14">
+            <p:sp>
+              <p:nvSpPr>
+                <p:cNvPr id="30" name="TextBox 29">
+                  <a:extLst>
+                    <a:ext uri="{FF2B5EF4-FFF2-40B4-BE49-F238E27FC236}">
+                      <a16:creationId xmlns:a16="http://schemas.microsoft.com/office/drawing/2014/main" id="{A8C46EA7-8DD8-03A1-6840-A76F5AA931F7}"/>
+                    </a:ext>
+                  </a:extLst>
+                </p:cNvPr>
+                <p:cNvSpPr txBox="1"/>
+                <p:nvPr/>
+              </p:nvSpPr>
+              <p:spPr>
+                <a:xfrm>
+                  <a:off x="5288829" y="1404453"/>
+                  <a:ext cx="1435756" cy="276999"/>
+                </a:xfrm>
+                <a:prstGeom prst="rect">
+                  <a:avLst/>
+                </a:prstGeom>
+                <a:solidFill>
+                  <a:schemeClr val="accent6">
+                    <a:lumMod val="20000"/>
+                    <a:lumOff val="80000"/>
+                  </a:schemeClr>
+                </a:solidFill>
+                <a:ln>
+                  <a:solidFill>
+                    <a:schemeClr val="accent6"/>
+                  </a:solidFill>
+                </a:ln>
+              </p:spPr>
+              <p:txBody>
+                <a:bodyPr wrap="square" rtlCol="0">
+                  <a:spAutoFit/>
+                </a:bodyPr>
+                <a:lstStyle/>
+                <a:p>
+                  <a:pPr/>
+                  <a14:m>
+                    <m:oMathPara xmlns:m="http://schemas.openxmlformats.org/officeDocument/2006/math">
+                      <m:oMathParaPr>
+                        <m:jc m:val="centerGroup"/>
+                      </m:oMathParaPr>
+                      <m:oMath xmlns:m="http://schemas.openxmlformats.org/officeDocument/2006/math">
+                        <m:d>
+                          <m:dPr>
+                            <m:begChr m:val="⟨"/>
+                            <m:endChr m:val="⟩"/>
+                            <m:ctrlPr>
+                              <a:rPr lang="en-US" sz="1200" b="1" i="1" smtClean="0">
+                                <a:latin typeface="Cambria Math" panose="02040503050406030204" pitchFamily="18" charset="0"/>
+                              </a:rPr>
+                            </m:ctrlPr>
+                          </m:dPr>
+                          <m:e>
+                            <m:sSub>
+                              <m:sSubPr>
+                                <m:ctrlPr>
+                                  <a:rPr lang="en-US" sz="1200" b="1" i="1">
+                                    <a:latin typeface="Cambria Math" panose="02040503050406030204" pitchFamily="18" charset="0"/>
+                                  </a:rPr>
+                                </m:ctrlPr>
+                              </m:sSubPr>
+                              <m:e>
+                                <m:r>
+                                  <a:rPr lang="en-US" sz="1200" b="1" i="0" smtClean="0">
+                                    <a:latin typeface="Cambria Math" panose="02040503050406030204" pitchFamily="18" charset="0"/>
+                                  </a:rPr>
+                                  <m:t>𝐑</m:t>
+                                </m:r>
+                              </m:e>
+                              <m:sub>
+                                <m:r>
+                                  <a:rPr lang="en-US" sz="1200" b="1" i="0" smtClean="0">
+                                    <a:latin typeface="Cambria Math" panose="02040503050406030204" pitchFamily="18" charset="0"/>
+                                  </a:rPr>
+                                  <m:t>𝐈</m:t>
+                                </m:r>
+                              </m:sub>
+                            </m:sSub>
+                            <m:r>
+                              <a:rPr lang="en-US" sz="1200" b="1" i="0" smtClean="0">
+                                <a:latin typeface="Cambria Math" panose="02040503050406030204" pitchFamily="18" charset="0"/>
+                              </a:rPr>
+                              <m:t> </m:t>
+                            </m:r>
+                            <m:r>
+                              <a:rPr lang="en-US" sz="1200" b="1" i="0" smtClean="0">
+                                <a:latin typeface="Cambria Math" panose="02040503050406030204" pitchFamily="18" charset="0"/>
+                              </a:rPr>
+                              <m:t>𝐃𝐨𝐋𝐏</m:t>
+                            </m:r>
+                          </m:e>
+                        </m:d>
+                      </m:oMath>
+                    </m:oMathPara>
+                  </a14:m>
+                  <a:endParaRPr lang="en-US" sz="1200" b="1" dirty="0"/>
+                </a:p>
+              </p:txBody>
+            </p:sp>
+          </mc:Choice>
+          <mc:Fallback>
+            <p:sp>
+              <p:nvSpPr>
+                <p:cNvPr id="30" name="TextBox 29">
+                  <a:extLst>
+                    <a:ext uri="{FF2B5EF4-FFF2-40B4-BE49-F238E27FC236}">
+                      <a16:creationId xmlns:a16="http://schemas.microsoft.com/office/drawing/2014/main" id="{A8C46EA7-8DD8-03A1-6840-A76F5AA931F7}"/>
+                    </a:ext>
+                  </a:extLst>
+                </p:cNvPr>
+                <p:cNvSpPr txBox="1">
+                  <a:spLocks noRot="1" noChangeAspect="1" noMove="1" noResize="1" noEditPoints="1" noAdjustHandles="1" noChangeArrowheads="1" noChangeShapeType="1" noTextEdit="1"/>
+                </p:cNvSpPr>
+                <p:nvPr/>
+              </p:nvSpPr>
+              <p:spPr>
+                <a:xfrm>
+                  <a:off x="5288829" y="1404453"/>
+                  <a:ext cx="1435756" cy="276999"/>
+                </a:xfrm>
+                <a:prstGeom prst="rect">
+                  <a:avLst/>
+                </a:prstGeom>
+                <a:blipFill>
+                  <a:blip r:embed="rId5"/>
+                  <a:stretch>
+                    <a:fillRect/>
+                  </a:stretch>
+                </a:blipFill>
+                <a:ln>
+                  <a:solidFill>
+                    <a:schemeClr val="accent6"/>
+                  </a:solidFill>
+                </a:ln>
+              </p:spPr>
+              <p:txBody>
+                <a:bodyPr/>
+                <a:lstStyle/>
+                <a:p>
+                  <a:r>
+                    <a:rPr lang="en-US">
+                      <a:noFill/>
+                    </a:rPr>
+                    <a:t> </a:t>
+                  </a:r>
+                </a:p>
+              </p:txBody>
+            </p:sp>
+          </mc:Fallback>
+        </mc:AlternateContent>
+        <mc:AlternateContent xmlns:mc="http://schemas.openxmlformats.org/markup-compatibility/2006">
+          <mc:Choice xmlns:a14="http://schemas.microsoft.com/office/drawing/2010/main" Requires="a14">
+            <p:sp>
+              <p:nvSpPr>
+                <p:cNvPr id="33" name="TextBox 32">
+                  <a:extLst>
+                    <a:ext uri="{FF2B5EF4-FFF2-40B4-BE49-F238E27FC236}">
+                      <a16:creationId xmlns:a16="http://schemas.microsoft.com/office/drawing/2014/main" id="{1A6C06D3-F788-A71A-FDA2-BD45617CB9F0}"/>
+                    </a:ext>
+                  </a:extLst>
+                </p:cNvPr>
+                <p:cNvSpPr txBox="1"/>
+                <p:nvPr/>
+              </p:nvSpPr>
+              <p:spPr>
+                <a:xfrm>
+                  <a:off x="6749364" y="1281342"/>
+                  <a:ext cx="985811" cy="523220"/>
+                </a:xfrm>
+                <a:prstGeom prst="rect">
+                  <a:avLst/>
+                </a:prstGeom>
+                <a:noFill/>
+              </p:spPr>
+              <p:txBody>
+                <a:bodyPr wrap="square" rtlCol="0">
+                  <a:spAutoFit/>
+                </a:bodyPr>
+                <a:lstStyle/>
+                <a:p>
+                  <a:pPr algn="ctr"/>
+                  <a14:m>
+                    <m:oMathPara xmlns:m="http://schemas.openxmlformats.org/officeDocument/2006/math">
+                      <m:oMathParaPr>
+                        <m:jc m:val="center"/>
+                      </m:oMathParaPr>
+                      <m:oMath xmlns:m="http://schemas.openxmlformats.org/officeDocument/2006/math">
+                        <m:r>
+                          <m:rPr>
+                            <m:sty m:val="p"/>
+                          </m:rPr>
+                          <a:rPr lang="en-US" sz="1400" b="0" i="0" smtClean="0">
+                            <a:latin typeface="Cambria Math" panose="02040503050406030204" pitchFamily="18" charset="0"/>
+                          </a:rPr>
+                          <m:t>Output</m:t>
+                        </m:r>
+                      </m:oMath>
+                      <m:oMath xmlns:m="http://schemas.openxmlformats.org/officeDocument/2006/math">
+                        <m:d>
+                          <m:dPr>
+                            <m:ctrlPr>
+                              <a:rPr lang="en-US" sz="1400" b="0" i="1" smtClean="0">
+                                <a:latin typeface="Cambria Math" panose="02040503050406030204" pitchFamily="18" charset="0"/>
+                              </a:rPr>
+                            </m:ctrlPr>
+                          </m:dPr>
+                          <m:e>
+                            <m:r>
+                              <a:rPr lang="en-US" sz="1400" b="0" i="1" smtClean="0">
+                                <a:latin typeface="Cambria Math" panose="02040503050406030204" pitchFamily="18" charset="0"/>
+                              </a:rPr>
+                              <m:t>22 </m:t>
+                            </m:r>
+                          </m:e>
+                        </m:d>
+                      </m:oMath>
+                    </m:oMathPara>
+                  </a14:m>
+                  <a:endParaRPr lang="en-US" sz="1400" dirty="0"/>
+                </a:p>
+              </p:txBody>
+            </p:sp>
+          </mc:Choice>
+          <mc:Fallback>
+            <p:sp>
+              <p:nvSpPr>
+                <p:cNvPr id="33" name="TextBox 32">
+                  <a:extLst>
+                    <a:ext uri="{FF2B5EF4-FFF2-40B4-BE49-F238E27FC236}">
+                      <a16:creationId xmlns:a16="http://schemas.microsoft.com/office/drawing/2014/main" id="{1A6C06D3-F788-A71A-FDA2-BD45617CB9F0}"/>
+                    </a:ext>
+                  </a:extLst>
+                </p:cNvPr>
+                <p:cNvSpPr txBox="1">
+                  <a:spLocks noRot="1" noChangeAspect="1" noMove="1" noResize="1" noEditPoints="1" noAdjustHandles="1" noChangeArrowheads="1" noChangeShapeType="1" noTextEdit="1"/>
+                </p:cNvSpPr>
+                <p:nvPr/>
+              </p:nvSpPr>
+              <p:spPr>
+                <a:xfrm>
+                  <a:off x="6749364" y="1281342"/>
+                  <a:ext cx="985811" cy="523220"/>
+                </a:xfrm>
+                <a:prstGeom prst="rect">
+                  <a:avLst/>
+                </a:prstGeom>
+                <a:blipFill>
+                  <a:blip r:embed="rId6"/>
+                  <a:stretch>
+                    <a:fillRect/>
+                  </a:stretch>
+                </a:blipFill>
+              </p:spPr>
+              <p:txBody>
+                <a:bodyPr/>
+                <a:lstStyle/>
+                <a:p>
+                  <a:r>
+                    <a:rPr lang="en-US">
+                      <a:noFill/>
+                    </a:rPr>
+                    <a:t> </a:t>
+                  </a:r>
+                </a:p>
+              </p:txBody>
+            </p:sp>
+          </mc:Fallback>
+        </mc:AlternateContent>
+      </p:grpSp>
+      <p:grpSp>
+        <p:nvGrpSpPr>
+          <p:cNvPr id="52" name="Group 51">
+            <a:extLst>
+              <a:ext uri="{FF2B5EF4-FFF2-40B4-BE49-F238E27FC236}">
+                <a16:creationId xmlns:a16="http://schemas.microsoft.com/office/drawing/2014/main" id="{E7D78DC5-443A-266C-8DA5-03AB497BE633}"/>
+              </a:ext>
+            </a:extLst>
+          </p:cNvPr>
+          <p:cNvGrpSpPr/>
+          <p:nvPr/>
+        </p:nvGrpSpPr>
+        <p:grpSpPr>
+          <a:xfrm>
+            <a:off x="5291749" y="3638050"/>
+            <a:ext cx="2443426" cy="523220"/>
+            <a:chOff x="5291749" y="3613122"/>
+            <a:chExt cx="2443426" cy="523220"/>
+          </a:xfrm>
+        </p:grpSpPr>
+        <mc:AlternateContent xmlns:mc="http://schemas.openxmlformats.org/markup-compatibility/2006">
+          <mc:Choice xmlns:a14="http://schemas.microsoft.com/office/drawing/2010/main" Requires="a14">
+            <p:sp>
+              <p:nvSpPr>
+                <p:cNvPr id="27" name="TextBox 26">
+                  <a:extLst>
+                    <a:ext uri="{FF2B5EF4-FFF2-40B4-BE49-F238E27FC236}">
+                      <a16:creationId xmlns:a16="http://schemas.microsoft.com/office/drawing/2014/main" id="{88A99FCC-CFBE-AD60-7036-4A72991FC414}"/>
+                    </a:ext>
+                  </a:extLst>
+                </p:cNvPr>
+                <p:cNvSpPr txBox="1"/>
+                <p:nvPr/>
+              </p:nvSpPr>
+              <p:spPr>
+                <a:xfrm>
+                  <a:off x="6749364" y="3613122"/>
+                  <a:ext cx="985811" cy="523220"/>
+                </a:xfrm>
+                <a:prstGeom prst="rect">
+                  <a:avLst/>
+                </a:prstGeom>
+                <a:noFill/>
+              </p:spPr>
+              <p:txBody>
+                <a:bodyPr wrap="square" rtlCol="0">
+                  <a:spAutoFit/>
+                </a:bodyPr>
+                <a:lstStyle/>
+                <a:p>
+                  <a:pPr/>
+                  <a14:m>
+                    <m:oMathPara xmlns:m="http://schemas.openxmlformats.org/officeDocument/2006/math">
+                      <m:oMathParaPr>
+                        <m:jc m:val="centerGroup"/>
+                      </m:oMathParaPr>
+                      <m:oMath xmlns:m="http://schemas.openxmlformats.org/officeDocument/2006/math">
+                        <m:r>
+                          <m:rPr>
+                            <m:sty m:val="p"/>
+                          </m:rPr>
+                          <a:rPr lang="en-US" sz="1400" b="0" i="0" smtClean="0">
+                            <a:latin typeface="Cambria Math" panose="02040503050406030204" pitchFamily="18" charset="0"/>
+                          </a:rPr>
+                          <m:t>Linear</m:t>
+                        </m:r>
+                        <m:r>
+                          <a:rPr lang="en-US" sz="1400" b="0" i="0" smtClean="0">
+                            <a:latin typeface="Cambria Math" panose="02040503050406030204" pitchFamily="18" charset="0"/>
+                          </a:rPr>
+                          <m:t>_1</m:t>
+                        </m:r>
+                      </m:oMath>
+                    </m:oMathPara>
+                  </a14:m>
+                  <a:endParaRPr lang="en-US" sz="1400" b="0" dirty="0">
+                    <a:latin typeface="Cambria Math" panose="02040503050406030204" pitchFamily="18" charset="0"/>
+                  </a:endParaRPr>
+                </a:p>
+                <a:p>
+                  <a:pPr/>
+                  <a14:m>
+                    <m:oMathPara xmlns:m="http://schemas.openxmlformats.org/officeDocument/2006/math">
+                      <m:oMathParaPr>
+                        <m:jc m:val="centerGroup"/>
+                      </m:oMathParaPr>
+                      <m:oMath xmlns:m="http://schemas.openxmlformats.org/officeDocument/2006/math">
+                        <m:d>
+                          <m:dPr>
+                            <m:ctrlPr>
+                              <a:rPr lang="en-US" sz="1400" b="0" i="1" smtClean="0">
+                                <a:latin typeface="Cambria Math" panose="02040503050406030204" pitchFamily="18" charset="0"/>
+                              </a:rPr>
+                            </m:ctrlPr>
+                          </m:dPr>
+                          <m:e>
+                            <m:r>
+                              <a:rPr lang="en-US" sz="1400" b="0" i="1" smtClean="0">
+                                <a:latin typeface="Cambria Math" panose="02040503050406030204" pitchFamily="18" charset="0"/>
+                              </a:rPr>
+                              <m:t>256</m:t>
+                            </m:r>
+                          </m:e>
+                        </m:d>
+                      </m:oMath>
+                    </m:oMathPara>
+                  </a14:m>
+                  <a:endParaRPr lang="en-US" sz="1400" dirty="0"/>
+                </a:p>
+              </p:txBody>
+            </p:sp>
+          </mc:Choice>
+          <mc:Fallback>
+            <p:sp>
+              <p:nvSpPr>
+                <p:cNvPr id="27" name="TextBox 26">
+                  <a:extLst>
+                    <a:ext uri="{FF2B5EF4-FFF2-40B4-BE49-F238E27FC236}">
+                      <a16:creationId xmlns:a16="http://schemas.microsoft.com/office/drawing/2014/main" id="{88A99FCC-CFBE-AD60-7036-4A72991FC414}"/>
+                    </a:ext>
+                  </a:extLst>
+                </p:cNvPr>
+                <p:cNvSpPr txBox="1">
+                  <a:spLocks noRot="1" noChangeAspect="1" noMove="1" noResize="1" noEditPoints="1" noAdjustHandles="1" noChangeArrowheads="1" noChangeShapeType="1" noTextEdit="1"/>
+                </p:cNvSpPr>
+                <p:nvPr/>
+              </p:nvSpPr>
+              <p:spPr>
+                <a:xfrm>
+                  <a:off x="6749364" y="3613122"/>
+                  <a:ext cx="985811" cy="523220"/>
+                </a:xfrm>
+                <a:prstGeom prst="rect">
+                  <a:avLst/>
+                </a:prstGeom>
+                <a:blipFill>
+                  <a:blip r:embed="rId7"/>
+                  <a:stretch>
+                    <a:fillRect/>
+                  </a:stretch>
+                </a:blipFill>
+              </p:spPr>
+              <p:txBody>
+                <a:bodyPr/>
+                <a:lstStyle/>
+                <a:p>
+                  <a:r>
+                    <a:rPr lang="en-US">
+                      <a:noFill/>
+                    </a:rPr>
+                    <a:t> </a:t>
+                  </a:r>
+                </a:p>
+              </p:txBody>
+            </p:sp>
+          </mc:Fallback>
+        </mc:AlternateContent>
+        <p:sp>
+          <p:nvSpPr>
+            <p:cNvPr id="36" name="Rectangle 35">
+              <a:extLst>
+                <a:ext uri="{FF2B5EF4-FFF2-40B4-BE49-F238E27FC236}">
+                  <a16:creationId xmlns:a16="http://schemas.microsoft.com/office/drawing/2014/main" id="{92A3919D-F821-8154-11D0-2E401682281F}"/>
+                </a:ext>
+              </a:extLst>
+            </p:cNvPr>
+            <p:cNvSpPr/>
+            <p:nvPr/>
+          </p:nvSpPr>
+          <p:spPr>
+            <a:xfrm>
+              <a:off x="5291749" y="3703800"/>
+              <a:ext cx="1435755" cy="341865"/>
+            </a:xfrm>
+            <a:prstGeom prst="rect">
+              <a:avLst/>
+            </a:prstGeom>
+            <a:solidFill>
+              <a:schemeClr val="accent2">
+                <a:lumMod val="20000"/>
+                <a:lumOff val="80000"/>
+              </a:schemeClr>
+            </a:solidFill>
+            <a:ln>
+              <a:solidFill>
+                <a:schemeClr val="accent2"/>
+              </a:solidFill>
+            </a:ln>
+          </p:spPr>
+          <p:style>
+            <a:lnRef idx="2">
+              <a:schemeClr val="accent1">
+                <a:shade val="15000"/>
+              </a:schemeClr>
+            </a:lnRef>
+            <a:fillRef idx="1">
+              <a:schemeClr val="accent1"/>
+            </a:fillRef>
+            <a:effectRef idx="0">
+              <a:schemeClr val="accent1"/>
+            </a:effectRef>
+            <a:fontRef idx="minor">
+              <a:schemeClr val="lt1"/>
+            </a:fontRef>
+          </p:style>
+          <p:txBody>
+            <a:bodyPr rtlCol="0" anchor="ctr"/>
+            <a:lstStyle/>
+            <a:p>
+              <a:pPr algn="ctr"/>
+              <a:r>
+                <a:rPr lang="en-US" sz="1200" b="1" dirty="0">
+                  <a:solidFill>
+                    <a:schemeClr val="tx1"/>
+                  </a:solidFill>
+                </a:rPr>
+                <a:t>Linear, ReLU</a:t>
+              </a:r>
+            </a:p>
+          </p:txBody>
+        </p:sp>
+      </p:grpSp>
+      <p:cxnSp>
+        <p:nvCxnSpPr>
+          <p:cNvPr id="40" name="Straight Arrow Connector 39">
+            <a:extLst>
+              <a:ext uri="{FF2B5EF4-FFF2-40B4-BE49-F238E27FC236}">
+                <a16:creationId xmlns:a16="http://schemas.microsoft.com/office/drawing/2014/main" id="{E345AA66-BFFE-18C2-3D3C-E52390A03A3E}"/>
+              </a:ext>
+            </a:extLst>
+          </p:cNvPr>
+          <p:cNvCxnSpPr>
+            <a:cxnSpLocks/>
+          </p:cNvCxnSpPr>
+          <p:nvPr/>
+        </p:nvCxnSpPr>
+        <p:spPr>
+          <a:xfrm flipV="1">
+            <a:off x="6009627" y="2892727"/>
+            <a:ext cx="0" cy="239673"/>
+          </a:xfrm>
+          <a:prstGeom prst="straightConnector1">
+            <a:avLst/>
+          </a:prstGeom>
+          <a:ln>
+            <a:tailEnd type="triangle"/>
+          </a:ln>
+        </p:spPr>
+        <p:style>
+          <a:lnRef idx="1">
+            <a:schemeClr val="accent2"/>
+          </a:lnRef>
+          <a:fillRef idx="0">
+            <a:schemeClr val="accent2"/>
+          </a:fillRef>
+          <a:effectRef idx="0">
+            <a:schemeClr val="accent2"/>
+          </a:effectRef>
+          <a:fontRef idx="minor">
+            <a:schemeClr val="tx1"/>
+          </a:fontRef>
+        </p:style>
+      </p:cxnSp>
+      <p:cxnSp>
+        <p:nvCxnSpPr>
+          <p:cNvPr id="43" name="Straight Arrow Connector 42">
+            <a:extLst>
+              <a:ext uri="{FF2B5EF4-FFF2-40B4-BE49-F238E27FC236}">
+                <a16:creationId xmlns:a16="http://schemas.microsoft.com/office/drawing/2014/main" id="{C922C61B-CF7F-8E7F-8EE9-6D4CA88FD0F8}"/>
+              </a:ext>
+            </a:extLst>
+          </p:cNvPr>
+          <p:cNvCxnSpPr>
+            <a:cxnSpLocks/>
+          </p:cNvCxnSpPr>
+          <p:nvPr/>
+        </p:nvCxnSpPr>
+        <p:spPr>
+          <a:xfrm flipV="1">
+            <a:off x="6009627" y="3484124"/>
+            <a:ext cx="0" cy="239674"/>
+          </a:xfrm>
+          <a:prstGeom prst="straightConnector1">
+            <a:avLst/>
+          </a:prstGeom>
+          <a:ln>
+            <a:tailEnd type="triangle"/>
+          </a:ln>
+        </p:spPr>
+        <p:style>
+          <a:lnRef idx="1">
+            <a:schemeClr val="accent2"/>
+          </a:lnRef>
+          <a:fillRef idx="0">
+            <a:schemeClr val="accent2"/>
+          </a:fillRef>
+          <a:effectRef idx="0">
+            <a:schemeClr val="accent2"/>
+          </a:effectRef>
+          <a:fontRef idx="minor">
+            <a:schemeClr val="tx1"/>
+          </a:fontRef>
+        </p:style>
+      </p:cxnSp>
+      <p:grpSp>
+        <p:nvGrpSpPr>
+          <p:cNvPr id="53" name="Group 52">
+            <a:extLst>
+              <a:ext uri="{FF2B5EF4-FFF2-40B4-BE49-F238E27FC236}">
+                <a16:creationId xmlns:a16="http://schemas.microsoft.com/office/drawing/2014/main" id="{16422FDB-E815-2964-3EAC-B03E2A1C29F3}"/>
+              </a:ext>
+            </a:extLst>
+          </p:cNvPr>
+          <p:cNvGrpSpPr/>
+          <p:nvPr/>
+        </p:nvGrpSpPr>
+        <p:grpSpPr>
+          <a:xfrm>
+            <a:off x="5291749" y="3046652"/>
+            <a:ext cx="2443426" cy="523220"/>
+            <a:chOff x="5291749" y="3057633"/>
+            <a:chExt cx="2443426" cy="523220"/>
+          </a:xfrm>
+        </p:grpSpPr>
+        <p:sp>
+          <p:nvSpPr>
+            <p:cNvPr id="37" name="Rectangle 36">
+              <a:extLst>
+                <a:ext uri="{FF2B5EF4-FFF2-40B4-BE49-F238E27FC236}">
+                  <a16:creationId xmlns:a16="http://schemas.microsoft.com/office/drawing/2014/main" id="{5E45FBDF-C1DE-24B9-5CC7-611A510712DF}"/>
+                </a:ext>
+              </a:extLst>
+            </p:cNvPr>
+            <p:cNvSpPr/>
+            <p:nvPr/>
+          </p:nvSpPr>
+          <p:spPr>
+            <a:xfrm>
+              <a:off x="5291749" y="3148311"/>
+              <a:ext cx="1435755" cy="341865"/>
+            </a:xfrm>
+            <a:prstGeom prst="rect">
+              <a:avLst/>
+            </a:prstGeom>
+            <a:solidFill>
+              <a:schemeClr val="accent2">
+                <a:lumMod val="20000"/>
+                <a:lumOff val="80000"/>
+              </a:schemeClr>
+            </a:solidFill>
+            <a:ln>
+              <a:solidFill>
+                <a:schemeClr val="accent2"/>
+              </a:solidFill>
+            </a:ln>
+          </p:spPr>
+          <p:style>
+            <a:lnRef idx="2">
+              <a:schemeClr val="accent1">
+                <a:shade val="15000"/>
+              </a:schemeClr>
+            </a:lnRef>
+            <a:fillRef idx="1">
+              <a:schemeClr val="accent1"/>
+            </a:fillRef>
+            <a:effectRef idx="0">
+              <a:schemeClr val="accent1"/>
+            </a:effectRef>
+            <a:fontRef idx="minor">
+              <a:schemeClr val="lt1"/>
+            </a:fontRef>
+          </p:style>
+          <p:txBody>
+            <a:bodyPr rtlCol="0" anchor="ctr"/>
+            <a:lstStyle/>
+            <a:p>
+              <a:pPr algn="ctr"/>
+              <a:r>
+                <a:rPr lang="en-US" sz="1200" b="1" dirty="0">
+                  <a:solidFill>
+                    <a:schemeClr val="tx1"/>
+                  </a:solidFill>
+                </a:rPr>
+                <a:t>Linear, ReLU</a:t>
+              </a:r>
+            </a:p>
+          </p:txBody>
+        </p:sp>
+        <mc:AlternateContent xmlns:mc="http://schemas.openxmlformats.org/markup-compatibility/2006">
+          <mc:Choice xmlns:a14="http://schemas.microsoft.com/office/drawing/2010/main" Requires="a14">
+            <p:sp>
+              <p:nvSpPr>
+                <p:cNvPr id="49" name="TextBox 48">
+                  <a:extLst>
+                    <a:ext uri="{FF2B5EF4-FFF2-40B4-BE49-F238E27FC236}">
+                      <a16:creationId xmlns:a16="http://schemas.microsoft.com/office/drawing/2014/main" id="{306AB3AE-3495-6243-F123-0F7E08F13172}"/>
+                    </a:ext>
+                  </a:extLst>
+                </p:cNvPr>
+                <p:cNvSpPr txBox="1"/>
+                <p:nvPr/>
+              </p:nvSpPr>
+              <p:spPr>
+                <a:xfrm>
+                  <a:off x="6749364" y="3057633"/>
+                  <a:ext cx="985811" cy="523220"/>
+                </a:xfrm>
+                <a:prstGeom prst="rect">
+                  <a:avLst/>
+                </a:prstGeom>
+                <a:noFill/>
+              </p:spPr>
+              <p:txBody>
+                <a:bodyPr wrap="square" rtlCol="0">
+                  <a:spAutoFit/>
+                </a:bodyPr>
+                <a:lstStyle/>
+                <a:p>
+                  <a:pPr/>
+                  <a14:m>
+                    <m:oMathPara xmlns:m="http://schemas.openxmlformats.org/officeDocument/2006/math">
+                      <m:oMathParaPr>
+                        <m:jc m:val="centerGroup"/>
+                      </m:oMathParaPr>
+                      <m:oMath xmlns:m="http://schemas.openxmlformats.org/officeDocument/2006/math">
+                        <m:r>
+                          <m:rPr>
+                            <m:sty m:val="p"/>
+                          </m:rPr>
+                          <a:rPr lang="en-US" sz="1400" b="0" i="0" smtClean="0">
+                            <a:latin typeface="Cambria Math" panose="02040503050406030204" pitchFamily="18" charset="0"/>
+                          </a:rPr>
+                          <m:t>Linear</m:t>
+                        </m:r>
+                        <m:r>
+                          <a:rPr lang="en-US" sz="1400" b="0" i="0" smtClean="0">
+                            <a:latin typeface="Cambria Math" panose="02040503050406030204" pitchFamily="18" charset="0"/>
+                          </a:rPr>
+                          <m:t>_2</m:t>
+                        </m:r>
+                      </m:oMath>
+                    </m:oMathPara>
+                  </a14:m>
+                  <a:endParaRPr lang="en-US" sz="1400" b="0" dirty="0">
+                    <a:latin typeface="Cambria Math" panose="02040503050406030204" pitchFamily="18" charset="0"/>
+                  </a:endParaRPr>
+                </a:p>
+                <a:p>
+                  <a:pPr/>
+                  <a14:m>
+                    <m:oMathPara xmlns:m="http://schemas.openxmlformats.org/officeDocument/2006/math">
+                      <m:oMathParaPr>
+                        <m:jc m:val="centerGroup"/>
+                      </m:oMathParaPr>
+                      <m:oMath xmlns:m="http://schemas.openxmlformats.org/officeDocument/2006/math">
+                        <m:d>
+                          <m:dPr>
+                            <m:ctrlPr>
+                              <a:rPr lang="en-US" sz="1400" b="0" i="1" smtClean="0">
+                                <a:latin typeface="Cambria Math" panose="02040503050406030204" pitchFamily="18" charset="0"/>
+                              </a:rPr>
+                            </m:ctrlPr>
+                          </m:dPr>
+                          <m:e>
+                            <m:r>
+                              <a:rPr lang="en-US" sz="1400" b="0" i="1" smtClean="0">
+                                <a:latin typeface="Cambria Math" panose="02040503050406030204" pitchFamily="18" charset="0"/>
+                              </a:rPr>
+                              <m:t>256</m:t>
+                            </m:r>
+                          </m:e>
+                        </m:d>
+                      </m:oMath>
+                    </m:oMathPara>
+                  </a14:m>
+                  <a:endParaRPr lang="en-US" sz="1400" dirty="0"/>
+                </a:p>
+              </p:txBody>
+            </p:sp>
+          </mc:Choice>
+          <mc:Fallback>
+            <p:sp>
+              <p:nvSpPr>
+                <p:cNvPr id="49" name="TextBox 48">
+                  <a:extLst>
+                    <a:ext uri="{FF2B5EF4-FFF2-40B4-BE49-F238E27FC236}">
+                      <a16:creationId xmlns:a16="http://schemas.microsoft.com/office/drawing/2014/main" id="{306AB3AE-3495-6243-F123-0F7E08F13172}"/>
+                    </a:ext>
+                  </a:extLst>
+                </p:cNvPr>
+                <p:cNvSpPr txBox="1">
+                  <a:spLocks noRot="1" noChangeAspect="1" noMove="1" noResize="1" noEditPoints="1" noAdjustHandles="1" noChangeArrowheads="1" noChangeShapeType="1" noTextEdit="1"/>
+                </p:cNvSpPr>
+                <p:nvPr/>
+              </p:nvSpPr>
+              <p:spPr>
+                <a:xfrm>
+                  <a:off x="6749364" y="3057633"/>
+                  <a:ext cx="985811" cy="523220"/>
+                </a:xfrm>
+                <a:prstGeom prst="rect">
+                  <a:avLst/>
+                </a:prstGeom>
+                <a:blipFill>
+                  <a:blip r:embed="rId8"/>
+                  <a:stretch>
+                    <a:fillRect/>
+                  </a:stretch>
+                </a:blipFill>
+              </p:spPr>
+              <p:txBody>
+                <a:bodyPr/>
+                <a:lstStyle/>
+                <a:p>
+                  <a:r>
+                    <a:rPr lang="en-US">
+                      <a:noFill/>
+                    </a:rPr>
+                    <a:t> </a:t>
+                  </a:r>
+                </a:p>
+              </p:txBody>
+            </p:sp>
+          </mc:Fallback>
+        </mc:AlternateContent>
+      </p:grpSp>
+      <p:grpSp>
+        <p:nvGrpSpPr>
+          <p:cNvPr id="54" name="Group 53">
+            <a:extLst>
+              <a:ext uri="{FF2B5EF4-FFF2-40B4-BE49-F238E27FC236}">
+                <a16:creationId xmlns:a16="http://schemas.microsoft.com/office/drawing/2014/main" id="{27FDA127-BB2E-E33E-EE71-A99C624DDB70}"/>
+              </a:ext>
+            </a:extLst>
+          </p:cNvPr>
+          <p:cNvGrpSpPr/>
+          <p:nvPr/>
+        </p:nvGrpSpPr>
+        <p:grpSpPr>
+          <a:xfrm>
+            <a:off x="5291749" y="2455255"/>
+            <a:ext cx="2443426" cy="523220"/>
+            <a:chOff x="5291749" y="2444682"/>
+            <a:chExt cx="2443426" cy="523220"/>
+          </a:xfrm>
+        </p:grpSpPr>
+        <p:sp>
+          <p:nvSpPr>
+            <p:cNvPr id="26" name="Rectangle 25">
+              <a:extLst>
+                <a:ext uri="{FF2B5EF4-FFF2-40B4-BE49-F238E27FC236}">
+                  <a16:creationId xmlns:a16="http://schemas.microsoft.com/office/drawing/2014/main" id="{A5F08CD2-6B71-C153-66AB-C8304FF7B595}"/>
+                </a:ext>
+              </a:extLst>
+            </p:cNvPr>
+            <p:cNvSpPr/>
+            <p:nvPr/>
+          </p:nvSpPr>
+          <p:spPr>
+            <a:xfrm>
+              <a:off x="5291749" y="2535360"/>
+              <a:ext cx="1435755" cy="341865"/>
+            </a:xfrm>
+            <a:prstGeom prst="rect">
+              <a:avLst/>
+            </a:prstGeom>
+            <a:solidFill>
+              <a:schemeClr val="accent2">
+                <a:lumMod val="20000"/>
+                <a:lumOff val="80000"/>
+              </a:schemeClr>
+            </a:solidFill>
+            <a:ln>
+              <a:solidFill>
+                <a:schemeClr val="accent2"/>
+              </a:solidFill>
+            </a:ln>
+          </p:spPr>
+          <p:style>
+            <a:lnRef idx="2">
+              <a:schemeClr val="accent1">
+                <a:shade val="15000"/>
+              </a:schemeClr>
+            </a:lnRef>
+            <a:fillRef idx="1">
+              <a:schemeClr val="accent1"/>
+            </a:fillRef>
+            <a:effectRef idx="0">
+              <a:schemeClr val="accent1"/>
+            </a:effectRef>
+            <a:fontRef idx="minor">
+              <a:schemeClr val="lt1"/>
+            </a:fontRef>
+          </p:style>
+          <p:txBody>
+            <a:bodyPr rtlCol="0" anchor="ctr"/>
+            <a:lstStyle/>
+            <a:p>
+              <a:pPr algn="ctr"/>
+              <a:r>
+                <a:rPr lang="en-US" sz="1200" b="1" dirty="0">
+                  <a:solidFill>
+                    <a:schemeClr val="tx1"/>
+                  </a:solidFill>
+                </a:rPr>
+                <a:t>Linear, ReLU</a:t>
+              </a:r>
+            </a:p>
+          </p:txBody>
+        </p:sp>
+        <mc:AlternateContent xmlns:mc="http://schemas.openxmlformats.org/markup-compatibility/2006">
+          <mc:Choice xmlns:a14="http://schemas.microsoft.com/office/drawing/2010/main" Requires="a14">
+            <p:sp>
+              <p:nvSpPr>
+                <p:cNvPr id="50" name="TextBox 49">
+                  <a:extLst>
+                    <a:ext uri="{FF2B5EF4-FFF2-40B4-BE49-F238E27FC236}">
+                      <a16:creationId xmlns:a16="http://schemas.microsoft.com/office/drawing/2014/main" id="{F9E6FDE1-1B87-AA14-D715-A26BA57068AB}"/>
+                    </a:ext>
+                  </a:extLst>
+                </p:cNvPr>
+                <p:cNvSpPr txBox="1"/>
+                <p:nvPr/>
+              </p:nvSpPr>
+              <p:spPr>
+                <a:xfrm>
+                  <a:off x="6749364" y="2444682"/>
+                  <a:ext cx="985811" cy="523220"/>
+                </a:xfrm>
+                <a:prstGeom prst="rect">
+                  <a:avLst/>
+                </a:prstGeom>
+                <a:noFill/>
+              </p:spPr>
+              <p:txBody>
+                <a:bodyPr wrap="square" rtlCol="0">
+                  <a:spAutoFit/>
+                </a:bodyPr>
+                <a:lstStyle/>
+                <a:p>
+                  <a:pPr/>
+                  <a14:m>
+                    <m:oMathPara xmlns:m="http://schemas.openxmlformats.org/officeDocument/2006/math">
+                      <m:oMathParaPr>
+                        <m:jc m:val="centerGroup"/>
+                      </m:oMathParaPr>
+                      <m:oMath xmlns:m="http://schemas.openxmlformats.org/officeDocument/2006/math">
+                        <m:r>
+                          <m:rPr>
+                            <m:sty m:val="p"/>
+                          </m:rPr>
+                          <a:rPr lang="en-US" sz="1400" b="0" i="0" smtClean="0">
+                            <a:latin typeface="Cambria Math" panose="02040503050406030204" pitchFamily="18" charset="0"/>
+                          </a:rPr>
+                          <m:t>Linear</m:t>
+                        </m:r>
+                        <m:r>
+                          <a:rPr lang="en-US" sz="1400" b="0" i="0" smtClean="0">
+                            <a:latin typeface="Cambria Math" panose="02040503050406030204" pitchFamily="18" charset="0"/>
+                          </a:rPr>
+                          <m:t>_3</m:t>
+                        </m:r>
+                      </m:oMath>
+                    </m:oMathPara>
+                  </a14:m>
+                  <a:endParaRPr lang="en-US" sz="1400" b="0" dirty="0">
+                    <a:latin typeface="Cambria Math" panose="02040503050406030204" pitchFamily="18" charset="0"/>
+                  </a:endParaRPr>
+                </a:p>
+                <a:p>
+                  <a:pPr/>
+                  <a14:m>
+                    <m:oMathPara xmlns:m="http://schemas.openxmlformats.org/officeDocument/2006/math">
+                      <m:oMathParaPr>
+                        <m:jc m:val="centerGroup"/>
+                      </m:oMathParaPr>
+                      <m:oMath xmlns:m="http://schemas.openxmlformats.org/officeDocument/2006/math">
+                        <m:d>
+                          <m:dPr>
+                            <m:ctrlPr>
+                              <a:rPr lang="en-US" sz="1400" b="0" i="1" smtClean="0">
+                                <a:latin typeface="Cambria Math" panose="02040503050406030204" pitchFamily="18" charset="0"/>
+                              </a:rPr>
+                            </m:ctrlPr>
+                          </m:dPr>
+                          <m:e>
+                            <m:r>
+                              <a:rPr lang="en-US" sz="1400" b="0" i="1" smtClean="0">
+                                <a:latin typeface="Cambria Math" panose="02040503050406030204" pitchFamily="18" charset="0"/>
+                              </a:rPr>
+                              <m:t>256</m:t>
+                            </m:r>
+                          </m:e>
+                        </m:d>
+                      </m:oMath>
+                    </m:oMathPara>
+                  </a14:m>
+                  <a:endParaRPr lang="en-US" sz="1400" dirty="0"/>
+                </a:p>
+              </p:txBody>
+            </p:sp>
+          </mc:Choice>
+          <mc:Fallback>
+            <p:sp>
+              <p:nvSpPr>
+                <p:cNvPr id="50" name="TextBox 49">
+                  <a:extLst>
+                    <a:ext uri="{FF2B5EF4-FFF2-40B4-BE49-F238E27FC236}">
+                      <a16:creationId xmlns:a16="http://schemas.microsoft.com/office/drawing/2014/main" id="{F9E6FDE1-1B87-AA14-D715-A26BA57068AB}"/>
+                    </a:ext>
+                  </a:extLst>
+                </p:cNvPr>
+                <p:cNvSpPr txBox="1">
+                  <a:spLocks noRot="1" noChangeAspect="1" noMove="1" noResize="1" noEditPoints="1" noAdjustHandles="1" noChangeArrowheads="1" noChangeShapeType="1" noTextEdit="1"/>
+                </p:cNvSpPr>
+                <p:nvPr/>
+              </p:nvSpPr>
+              <p:spPr>
+                <a:xfrm>
+                  <a:off x="6749364" y="2444682"/>
+                  <a:ext cx="985811" cy="523220"/>
+                </a:xfrm>
+                <a:prstGeom prst="rect">
+                  <a:avLst/>
+                </a:prstGeom>
+                <a:blipFill>
+                  <a:blip r:embed="rId9"/>
+                  <a:stretch>
+                    <a:fillRect/>
+                  </a:stretch>
+                </a:blipFill>
+              </p:spPr>
+              <p:txBody>
+                <a:bodyPr/>
+                <a:lstStyle/>
+                <a:p>
+                  <a:r>
+                    <a:rPr lang="en-US">
+                      <a:noFill/>
+                    </a:rPr>
+                    <a:t> </a:t>
+                  </a:r>
+                </a:p>
+              </p:txBody>
+            </p:sp>
+          </mc:Fallback>
+        </mc:AlternateContent>
+      </p:grpSp>
+    </p:spTree>
+    <p:extLst>
+      <p:ext uri="{BB962C8B-B14F-4D97-AF65-F5344CB8AC3E}">
+        <p14:creationId xmlns:p14="http://schemas.microsoft.com/office/powerpoint/2010/main" val="1833983100"/>
+      </p:ext>
+    </p:extLst>
+  </p:cSld>
+  <p:clrMapOvr>
+    <a:masterClrMapping/>
+  </p:clrMapOvr>
+</p:sld>
+</file>
+
+<file path=ppt/slides/slide4.xml><?xml version="1.0" encoding="utf-8"?>
+<p:sld xmlns:a="http://schemas.openxmlformats.org/drawingml/2006/main" xmlns:r="http://schemas.openxmlformats.org/officeDocument/2006/relationships" xmlns:p="http://schemas.openxmlformats.org/presentationml/2006/main">
+  <p:cSld>
+    <p:spTree>
+      <p:nvGrpSpPr>
+        <p:cNvPr id="1" name=""/>
+        <p:cNvGrpSpPr/>
+        <p:nvPr/>
+      </p:nvGrpSpPr>
+      <p:grpSpPr>
+        <a:xfrm>
+          <a:off x="0" y="0"/>
+          <a:ext cx="0" cy="0"/>
+          <a:chOff x="0" y="0"/>
+          <a:chExt cx="0" cy="0"/>
+        </a:xfrm>
+      </p:grpSpPr>
       <p:sp>
         <p:nvSpPr>
           <p:cNvPr id="3" name="TextBox 2">
@@ -6107,8 +7891,8 @@
             </a:p>
           </p:txBody>
         </p:sp>
-        <mc:AlternateContent xmlns:mc="http://schemas.openxmlformats.org/markup-compatibility/2006">
-          <mc:Choice xmlns:a14="http://schemas.microsoft.com/office/drawing/2010/main" Requires="a14">
+        <mc:AlternateContent xmlns:mc="http://schemas.openxmlformats.org/markup-compatibility/2006" xmlns:a14="http://schemas.microsoft.com/office/drawing/2010/main">
+          <mc:Choice Requires="a14">
             <p:sp>
               <p:nvSpPr>
                 <p:cNvPr id="24" name="Rectangle 23">
@@ -6198,7 +7982,7 @@
               </p:txBody>
             </p:sp>
           </mc:Choice>
-          <mc:Fallback>
+          <mc:Fallback xmlns="">
             <p:sp>
               <p:nvSpPr>
                 <p:cNvPr id="24" name="Rectangle 23">
@@ -6248,8 +8032,8 @@
             </p:sp>
           </mc:Fallback>
         </mc:AlternateContent>
-        <mc:AlternateContent xmlns:mc="http://schemas.openxmlformats.org/markup-compatibility/2006">
-          <mc:Choice xmlns:a14="http://schemas.microsoft.com/office/drawing/2010/main" Requires="a14">
+        <mc:AlternateContent xmlns:mc="http://schemas.openxmlformats.org/markup-compatibility/2006" xmlns:a14="http://schemas.microsoft.com/office/drawing/2010/main">
+          <mc:Choice Requires="a14">
             <p:sp>
               <p:nvSpPr>
                 <p:cNvPr id="32" name="Rectangle 31">
@@ -6339,7 +8123,7 @@
               </p:txBody>
             </p:sp>
           </mc:Choice>
-          <mc:Fallback>
+          <mc:Fallback xmlns="">
             <p:sp>
               <p:nvSpPr>
                 <p:cNvPr id="32" name="Rectangle 31">
@@ -6389,8 +8173,8 @@
             </p:sp>
           </mc:Fallback>
         </mc:AlternateContent>
-        <mc:AlternateContent xmlns:mc="http://schemas.openxmlformats.org/markup-compatibility/2006">
-          <mc:Choice xmlns:a14="http://schemas.microsoft.com/office/drawing/2010/main" Requires="a14">
+        <mc:AlternateContent xmlns:mc="http://schemas.openxmlformats.org/markup-compatibility/2006" xmlns:a14="http://schemas.microsoft.com/office/drawing/2010/main">
+          <mc:Choice Requires="a14">
             <p:sp>
               <p:nvSpPr>
                 <p:cNvPr id="35" name="Rectangle 34">
@@ -6471,7 +8255,7 @@
               </p:txBody>
             </p:sp>
           </mc:Choice>
-          <mc:Fallback>
+          <mc:Fallback xmlns="">
             <p:sp>
               <p:nvSpPr>
                 <p:cNvPr id="35" name="Rectangle 34">
@@ -6578,8 +8362,8 @@
             <a:chExt cx="838022" cy="815402"/>
           </a:xfrm>
         </p:grpSpPr>
-        <mc:AlternateContent xmlns:mc="http://schemas.openxmlformats.org/markup-compatibility/2006">
-          <mc:Choice xmlns:a14="http://schemas.microsoft.com/office/drawing/2010/main" Requires="a14">
+        <mc:AlternateContent xmlns:mc="http://schemas.openxmlformats.org/markup-compatibility/2006" xmlns:a14="http://schemas.microsoft.com/office/drawing/2010/main">
+          <mc:Choice Requires="a14">
             <p:sp>
               <p:nvSpPr>
                 <p:cNvPr id="38" name="Rectangle 37">
@@ -6660,7 +8444,7 @@
               </p:txBody>
             </p:sp>
           </mc:Choice>
-          <mc:Fallback>
+          <mc:Fallback xmlns="">
             <p:sp>
               <p:nvSpPr>
                 <p:cNvPr id="38" name="Rectangle 37">
@@ -6823,8 +8607,8 @@
             <a:chExt cx="838022" cy="823022"/>
           </a:xfrm>
         </p:grpSpPr>
-        <mc:AlternateContent xmlns:mc="http://schemas.openxmlformats.org/markup-compatibility/2006">
-          <mc:Choice xmlns:a14="http://schemas.microsoft.com/office/drawing/2010/main" Requires="a14">
+        <mc:AlternateContent xmlns:mc="http://schemas.openxmlformats.org/markup-compatibility/2006" xmlns:a14="http://schemas.microsoft.com/office/drawing/2010/main">
+          <mc:Choice Requires="a14">
             <p:sp>
               <p:nvSpPr>
                 <p:cNvPr id="53" name="Rectangle 52">
@@ -6905,7 +8689,7 @@
               </p:txBody>
             </p:sp>
           </mc:Choice>
-          <mc:Fallback>
+          <mc:Fallback xmlns="">
             <p:sp>
               <p:nvSpPr>
                 <p:cNvPr id="53" name="Rectangle 52">
@@ -7124,8 +8908,8 @@
             </a:p>
           </p:txBody>
         </p:sp>
-        <mc:AlternateContent xmlns:mc="http://schemas.openxmlformats.org/markup-compatibility/2006">
-          <mc:Choice xmlns:a14="http://schemas.microsoft.com/office/drawing/2010/main" Requires="a14">
+        <mc:AlternateContent xmlns:mc="http://schemas.openxmlformats.org/markup-compatibility/2006" xmlns:a14="http://schemas.microsoft.com/office/drawing/2010/main">
+          <mc:Choice Requires="a14">
             <p:sp>
               <p:nvSpPr>
                 <p:cNvPr id="94" name="Rectangle 93">
@@ -7215,7 +8999,7 @@
               </p:txBody>
             </p:sp>
           </mc:Choice>
-          <mc:Fallback>
+          <mc:Fallback xmlns="">
             <p:sp>
               <p:nvSpPr>
                 <p:cNvPr id="94" name="Rectangle 93">
@@ -7315,7 +9099,7 @@
 </p:sld>
 </file>
 
-<file path=ppt/slides/slide4.xml><?xml version="1.0" encoding="utf-8"?>
+<file path=ppt/slides/slide5.xml><?xml version="1.0" encoding="utf-8"?>
 <p:sld xmlns:a="http://schemas.openxmlformats.org/drawingml/2006/main" xmlns:r="http://schemas.openxmlformats.org/officeDocument/2006/relationships" xmlns:p="http://schemas.openxmlformats.org/presentationml/2006/main">
   <p:cSld>
     <p:spTree>
@@ -10025,7 +11809,7 @@
 </p:sld>
 </file>
 
-<file path=ppt/slides/slide5.xml><?xml version="1.0" encoding="utf-8"?>
+<file path=ppt/slides/slide6.xml><?xml version="1.0" encoding="utf-8"?>
 <p:sld xmlns:a="http://schemas.openxmlformats.org/drawingml/2006/main" xmlns:r="http://schemas.openxmlformats.org/officeDocument/2006/relationships" xmlns:p="http://schemas.openxmlformats.org/presentationml/2006/main">
   <p:cSld>
     <p:spTree>
@@ -13877,7 +15661,7 @@
 </p:sld>
 </file>
 
-<file path=ppt/slides/slide6.xml><?xml version="1.0" encoding="utf-8"?>
+<file path=ppt/slides/slide7.xml><?xml version="1.0" encoding="utf-8"?>
 <p:sld xmlns:a="http://schemas.openxmlformats.org/drawingml/2006/main" xmlns:r="http://schemas.openxmlformats.org/officeDocument/2006/relationships" xmlns:p="http://schemas.openxmlformats.org/presentationml/2006/main">
   <p:cSld>
     <p:spTree>

</xml_diff>